<commit_message>
update slide for flask
</commit_message>
<xml_diff>
--- a/Project 4 Group 6 112922.pptx
+++ b/Project 4 Group 6 112922.pptx
@@ -118,6 +118,11 @@
       </a:defRPr>
     </a:lvl9pPr>
   </p:defaultTextStyle>
+  <p:extLst>
+    <p:ext uri="{EFAFB233-063F-42B5-8137-9DF3F51BA10A}">
+      <p15:sldGuideLst xmlns:p15="http://schemas.microsoft.com/office/powerpoint/2012/main"/>
+    </p:ext>
+  </p:extLst>
 </p:presentation>
 </file>
 
@@ -203,7 +208,7 @@
           <a:p>
             <a:fld id="{C0CFC932-687B-D94D-BAE4-A389EC262234}" type="datetimeFigureOut">
               <a:rPr lang="en-US" smtClean="0"/>
-              <a:t>11/28/22</a:t>
+              <a:t>11/29/22</a:t>
             </a:fld>
             <a:endParaRPr lang="en-US"/>
           </a:p>
@@ -1779,7 +1784,7 @@
           <a:p>
             <a:fld id="{78ABE3C1-DBE1-495D-B57B-2849774B866A}" type="datetimeFigureOut">
               <a:rPr lang="en-US" dirty="0"/>
-              <a:t>11/28/22</a:t>
+              <a:t>11/29/22</a:t>
             </a:fld>
             <a:endParaRPr lang="en-US" dirty="0"/>
           </a:p>
@@ -2188,7 +2193,7 @@
           <a:p>
             <a:fld id="{446C117F-5CCF-4837-BE5F-2B92066CAFAF}" type="datetimeFigureOut">
               <a:rPr lang="en-US" dirty="0"/>
-              <a:t>11/28/22</a:t>
+              <a:t>11/29/22</a:t>
             </a:fld>
             <a:endParaRPr lang="en-US" dirty="0"/>
           </a:p>
@@ -2519,7 +2524,7 @@
           <a:p>
             <a:fld id="{84EB90BD-B6CE-46B7-997F-7313B992CCDC}" type="datetimeFigureOut">
               <a:rPr lang="en-US" dirty="0"/>
-              <a:t>11/28/22</a:t>
+              <a:t>11/29/22</a:t>
             </a:fld>
             <a:endParaRPr lang="en-US" dirty="0"/>
           </a:p>
@@ -2919,7 +2924,7 @@
           <a:p>
             <a:fld id="{CDB9D11F-B188-461D-B23F-39381795C052}" type="datetimeFigureOut">
               <a:rPr lang="en-US" dirty="0"/>
-              <a:t>11/28/22</a:t>
+              <a:t>11/29/22</a:t>
             </a:fld>
             <a:endParaRPr lang="en-US" dirty="0"/>
           </a:p>
@@ -3482,7 +3487,7 @@
           <a:p>
             <a:fld id="{52E6D8D9-55A2-4063-B0F3-121F44549695}" type="datetimeFigureOut">
               <a:rPr lang="en-US" dirty="0"/>
-              <a:t>11/28/22</a:t>
+              <a:t>11/29/22</a:t>
             </a:fld>
             <a:endParaRPr lang="en-US" dirty="0"/>
           </a:p>
@@ -4158,7 +4163,7 @@
           <a:p>
             <a:fld id="{D4B24536-994D-4021-A283-9F449C0DB509}" type="datetimeFigureOut">
               <a:rPr lang="en-US" dirty="0"/>
-              <a:t>11/28/22</a:t>
+              <a:t>11/29/22</a:t>
             </a:fld>
             <a:endParaRPr lang="en-US" dirty="0"/>
           </a:p>
@@ -5066,7 +5071,7 @@
           <a:p>
             <a:fld id="{3CBBBB78-C96F-47B7-AB17-D852CA960AC9}" type="datetimeFigureOut">
               <a:rPr lang="en-US" dirty="0"/>
-              <a:t>11/28/22</a:t>
+              <a:t>11/29/22</a:t>
             </a:fld>
             <a:endParaRPr lang="en-US" dirty="0"/>
           </a:p>
@@ -5374,7 +5379,7 @@
           <a:p>
             <a:fld id="{1FA3F48C-C7C6-4055-9F49-3777875E72AE}" type="datetimeFigureOut">
               <a:rPr lang="en-US" dirty="0"/>
-              <a:t>11/28/22</a:t>
+              <a:t>11/29/22</a:t>
             </a:fld>
             <a:endParaRPr lang="en-US" dirty="0"/>
           </a:p>
@@ -5633,7 +5638,7 @@
           <a:p>
             <a:fld id="{6178E61D-D431-422C-9764-11DAFE33AB63}" type="datetimeFigureOut">
               <a:rPr lang="en-US" dirty="0"/>
-              <a:t>11/28/22</a:t>
+              <a:t>11/29/22</a:t>
             </a:fld>
             <a:endParaRPr lang="en-US" dirty="0"/>
           </a:p>
@@ -5952,7 +5957,7 @@
           <a:p>
             <a:fld id="{12DE42F4-6EEF-4EF7-8ED4-2208F0F89A08}" type="datetimeFigureOut">
               <a:rPr lang="en-US" dirty="0"/>
-              <a:t>11/28/22</a:t>
+              <a:t>11/29/22</a:t>
             </a:fld>
             <a:endParaRPr lang="en-US" dirty="0"/>
           </a:p>
@@ -6336,7 +6341,7 @@
           <a:p>
             <a:fld id="{30578ACC-22D6-47C1-A373-4FD133E34F3C}" type="datetimeFigureOut">
               <a:rPr lang="en-US" dirty="0"/>
-              <a:t>11/28/22</a:t>
+              <a:t>11/29/22</a:t>
             </a:fld>
             <a:endParaRPr lang="en-US" dirty="0"/>
           </a:p>
@@ -6707,7 +6712,7 @@
           <a:p>
             <a:fld id="{4E5A6C69-6797-4E8A-BF37-F2C3751466E9}" type="datetimeFigureOut">
               <a:rPr lang="en-US" dirty="0"/>
-              <a:t>11/28/22</a:t>
+              <a:t>11/29/22</a:t>
             </a:fld>
             <a:endParaRPr lang="en-US" dirty="0"/>
           </a:p>
@@ -7208,7 +7213,7 @@
           <a:p>
             <a:fld id="{D82014A1-A632-4878-A0D3-F52BA7563730}" type="datetimeFigureOut">
               <a:rPr lang="en-US" dirty="0"/>
-              <a:t>11/28/22</a:t>
+              <a:t>11/29/22</a:t>
             </a:fld>
             <a:endParaRPr lang="en-US" dirty="0"/>
           </a:p>
@@ -7460,7 +7465,7 @@
           <a:p>
             <a:fld id="{CE99F462-093F-4566-844B-4C71F2739DA5}" type="datetimeFigureOut">
               <a:rPr lang="en-US" dirty="0"/>
-              <a:t>11/28/22</a:t>
+              <a:t>11/29/22</a:t>
             </a:fld>
             <a:endParaRPr lang="en-US" dirty="0"/>
           </a:p>
@@ -7618,7 +7623,7 @@
           <a:p>
             <a:fld id="{3D24A7AC-904D-4781-85BA-7D10C17ED021}" type="datetimeFigureOut">
               <a:rPr lang="en-US" dirty="0"/>
-              <a:t>11/28/22</a:t>
+              <a:t>11/29/22</a:t>
             </a:fld>
             <a:endParaRPr lang="en-US" dirty="0"/>
           </a:p>
@@ -8003,7 +8008,7 @@
           <a:p>
             <a:fld id="{E331444B-B92B-4E27-8C94-BB93EAF5CB18}" type="datetimeFigureOut">
               <a:rPr lang="en-US" dirty="0"/>
-              <a:t>11/28/22</a:t>
+              <a:t>11/29/22</a:t>
             </a:fld>
             <a:endParaRPr lang="en-US" dirty="0"/>
           </a:p>
@@ -8407,7 +8412,7 @@
           <a:p>
             <a:fld id="{363EFA5E-FA76-400D-B3DC-F0BA90E6D107}" type="datetimeFigureOut">
               <a:rPr lang="en-US" dirty="0"/>
-              <a:t>11/28/22</a:t>
+              <a:t>11/29/22</a:t>
             </a:fld>
             <a:endParaRPr lang="en-US" dirty="0"/>
           </a:p>
@@ -8646,7 +8651,7 @@
           <a:p>
             <a:fld id="{9D6E9DEC-419B-4CC5-A080-3B06BD5A8291}" type="datetimeFigureOut">
               <a:rPr lang="en-US" dirty="0"/>
-              <a:t>11/28/22</a:t>
+              <a:t>11/29/22</a:t>
             </a:fld>
             <a:endParaRPr lang="en-US" dirty="0"/>
           </a:p>
@@ -10446,6 +10451,41 @@
 <file path=ppt/slides/slide9.xml><?xml version="1.0" encoding="utf-8"?>
 <p:sld xmlns:a="http://schemas.openxmlformats.org/drawingml/2006/main" xmlns:r="http://schemas.openxmlformats.org/officeDocument/2006/relationships" xmlns:p="http://schemas.openxmlformats.org/presentationml/2006/main">
   <p:cSld>
+    <p:bg>
+      <p:bgPr>
+        <a:gradFill rotWithShape="1">
+          <a:gsLst>
+            <a:gs pos="0">
+              <a:schemeClr val="bg2">
+                <a:tint val="96000"/>
+                <a:shade val="100000"/>
+                <a:hueMod val="270000"/>
+                <a:satMod val="200000"/>
+                <a:lumMod val="128000"/>
+              </a:schemeClr>
+            </a:gs>
+            <a:gs pos="50000">
+              <a:schemeClr val="bg2">
+                <a:shade val="100000"/>
+                <a:hueMod val="100000"/>
+                <a:satMod val="110000"/>
+                <a:lumMod val="130000"/>
+              </a:schemeClr>
+            </a:gs>
+            <a:gs pos="100000">
+              <a:schemeClr val="bg2">
+                <a:shade val="78000"/>
+                <a:hueMod val="44000"/>
+                <a:satMod val="200000"/>
+                <a:lumMod val="69000"/>
+              </a:schemeClr>
+            </a:gs>
+          </a:gsLst>
+          <a:lin ang="2520000" scaled="0"/>
+        </a:gradFill>
+        <a:effectLst/>
+      </p:bgPr>
+    </p:bg>
     <p:spTree>
       <p:nvGrpSpPr>
         <p:cNvPr id="1" name=""/>
@@ -10476,13 +10516,20 @@
             <p:ph type="title"/>
           </p:nvPr>
         </p:nvSpPr>
-        <p:spPr/>
-        <p:txBody>
-          <a:bodyPr/>
-          <a:lstStyle/>
-          <a:p>
-            <a:r>
-              <a:rPr lang="en-US" dirty="0"/>
+        <p:spPr>
+          <a:xfrm>
+            <a:off x="680321" y="753228"/>
+            <a:ext cx="9613861" cy="1080938"/>
+          </a:xfrm>
+        </p:spPr>
+        <p:txBody>
+          <a:bodyPr>
+            <a:normAutofit/>
+          </a:bodyPr>
+          <a:lstStyle/>
+          <a:p>
+            <a:r>
+              <a:rPr lang="en-US"/>
               <a:t>Flask App Dashboard</a:t>
             </a:r>
           </a:p>
@@ -10504,57 +10551,144 @@
             <p:ph idx="1"/>
           </p:nvPr>
         </p:nvSpPr>
-        <p:spPr/>
-        <p:txBody>
-          <a:bodyPr/>
-          <a:lstStyle/>
-          <a:p>
-            <a:r>
-              <a:rPr lang="en-US" dirty="0"/>
-              <a:t>User-initiated</a:t>
-            </a:r>
-            <a:r>
-              <a:rPr lang="en-US" baseline="0" dirty="0"/>
-              <a:t> form</a:t>
-            </a:r>
-            <a:endParaRPr lang="en-US" dirty="0"/>
-          </a:p>
-          <a:p>
-            <a:r>
-              <a:rPr lang="en-US" dirty="0"/>
-              <a:t>MongoDB</a:t>
-            </a:r>
-          </a:p>
-          <a:p>
-            <a:r>
-              <a:rPr lang="en-US" dirty="0"/>
-              <a:t>Using ARIMA Model – Classification Accuracy 98%</a:t>
-            </a:r>
-          </a:p>
-          <a:p>
-            <a:r>
-              <a:rPr lang="en-US" dirty="0"/>
-              <a:t>Landing</a:t>
-            </a:r>
-            <a:r>
-              <a:rPr lang="en-US" baseline="0" dirty="0"/>
-              <a:t> page on Apple</a:t>
-            </a:r>
-          </a:p>
-          <a:p>
-            <a:r>
-              <a:rPr lang="en-US" baseline="0" dirty="0"/>
-              <a:t>Show the accuracy percentage for each ticker requested</a:t>
-            </a:r>
-          </a:p>
-          <a:p>
-            <a:r>
-              <a:rPr lang="en-US" dirty="0"/>
+        <p:spPr>
+          <a:xfrm>
+            <a:off x="680321" y="2336873"/>
+            <a:ext cx="5211977" cy="3599316"/>
+          </a:xfrm>
+        </p:spPr>
+        <p:txBody>
+          <a:bodyPr>
+            <a:normAutofit/>
+          </a:bodyPr>
+          <a:lstStyle/>
+          <a:p>
+            <a:r>
+              <a:rPr lang="en-US" sz="2000" dirty="0"/>
+              <a:t>User-interaction dashboard</a:t>
+            </a:r>
+          </a:p>
+          <a:p>
+            <a:r>
+              <a:rPr lang="en-US" sz="2000" dirty="0"/>
+              <a:t>Using Python Flask, JavaScript, HTML and MongoDB to create </a:t>
+            </a:r>
+          </a:p>
+          <a:p>
+            <a:r>
+              <a:rPr lang="en-US" sz="2000" dirty="0"/>
+              <a:t>Using ARIMA Model – Classification </a:t>
+            </a:r>
+          </a:p>
+          <a:p>
+            <a:pPr marL="0" indent="0">
+              <a:buNone/>
+            </a:pPr>
+            <a:r>
+              <a:rPr lang="en-US" sz="2000" dirty="0"/>
+              <a:t>   highest Accuracy among the models</a:t>
+            </a:r>
+          </a:p>
+          <a:p>
+            <a:r>
+              <a:rPr lang="en-US" sz="2000" baseline="0" dirty="0"/>
+              <a:t>Show the </a:t>
+            </a:r>
+            <a:r>
+              <a:rPr lang="en-US" sz="2000" dirty="0"/>
+              <a:t>stock trend</a:t>
+            </a:r>
+            <a:r>
+              <a:rPr lang="en-US" sz="2000" baseline="0" dirty="0"/>
+              <a:t> for each ticker requested</a:t>
+            </a:r>
+          </a:p>
+          <a:p>
+            <a:r>
+              <a:rPr lang="en-US" sz="2000" dirty="0"/>
               <a:t>Predicts up to 7 calendar days ahead</a:t>
             </a:r>
           </a:p>
         </p:txBody>
       </p:sp>
+      <p:pic>
+        <p:nvPicPr>
+          <p:cNvPr id="8" name="Picture 7" descr="Graphical user interface&#10;&#10;Description automatically generated">
+            <a:extLst>
+              <a:ext uri="{FF2B5EF4-FFF2-40B4-BE49-F238E27FC236}">
+                <a16:creationId xmlns:a16="http://schemas.microsoft.com/office/drawing/2014/main" id="{D9BB4B90-2CA3-C247-31BE-8433A8A9212D}"/>
+              </a:ext>
+            </a:extLst>
+          </p:cNvPr>
+          <p:cNvPicPr>
+            <a:picLocks noChangeAspect="1"/>
+          </p:cNvPicPr>
+          <p:nvPr/>
+        </p:nvPicPr>
+        <p:blipFill rotWithShape="1">
+          <a:blip r:embed="rId3"/>
+          <a:srcRect l="23535" r="23712" b="3"/>
+          <a:stretch/>
+        </p:blipFill>
+        <p:spPr>
+          <a:xfrm>
+            <a:off x="8947728" y="2336871"/>
+            <a:ext cx="2692907" cy="3598789"/>
+          </a:xfrm>
+          <a:prstGeom prst="rect">
+            <a:avLst/>
+          </a:prstGeom>
+          <a:ln>
+            <a:noFill/>
+          </a:ln>
+          <a:effectLst>
+            <a:outerShdw blurRad="76200" dist="63500" dir="5040000" algn="tl" rotWithShape="0">
+              <a:srgbClr val="000000">
+                <a:alpha val="41000"/>
+              </a:srgbClr>
+            </a:outerShdw>
+          </a:effectLst>
+        </p:spPr>
+      </p:pic>
+      <p:pic>
+        <p:nvPicPr>
+          <p:cNvPr id="5" name="Picture 4" descr="Graphical user interface&#10;&#10;Description automatically generated">
+            <a:extLst>
+              <a:ext uri="{FF2B5EF4-FFF2-40B4-BE49-F238E27FC236}">
+                <a16:creationId xmlns:a16="http://schemas.microsoft.com/office/drawing/2014/main" id="{9D614538-DBDE-8940-4600-55A05B7FF1B5}"/>
+              </a:ext>
+            </a:extLst>
+          </p:cNvPr>
+          <p:cNvPicPr>
+            <a:picLocks noChangeAspect="1"/>
+          </p:cNvPicPr>
+          <p:nvPr/>
+        </p:nvPicPr>
+        <p:blipFill rotWithShape="1">
+          <a:blip r:embed="rId4"/>
+          <a:srcRect l="24390" r="23043" b="-1"/>
+          <a:stretch/>
+        </p:blipFill>
+        <p:spPr>
+          <a:xfrm>
+            <a:off x="6096000" y="2336870"/>
+            <a:ext cx="2692907" cy="3598789"/>
+          </a:xfrm>
+          <a:prstGeom prst="rect">
+            <a:avLst/>
+          </a:prstGeom>
+          <a:ln>
+            <a:noFill/>
+          </a:ln>
+          <a:effectLst>
+            <a:outerShdw blurRad="76200" dist="63500" dir="5040000" algn="tl" rotWithShape="0">
+              <a:srgbClr val="000000">
+                <a:alpha val="41000"/>
+              </a:srgbClr>
+            </a:outerShdw>
+          </a:effectLst>
+        </p:spPr>
+      </p:pic>
     </p:spTree>
     <p:extLst>
       <p:ext uri="{BB962C8B-B14F-4D97-AF65-F5344CB8AC3E}">

</xml_diff>

<commit_message>
Updated slides - 5 to 8
</commit_message>
<xml_diff>
--- a/Project 4 Group 6 112922.pptx
+++ b/Project 4 Group 6 112922.pptx
@@ -12,9 +12,9 @@
     <p:sldId id="263" r:id="rId3"/>
     <p:sldId id="258" r:id="rId4"/>
     <p:sldId id="257" r:id="rId5"/>
-    <p:sldId id="259" r:id="rId6"/>
-    <p:sldId id="265" r:id="rId7"/>
-    <p:sldId id="266" r:id="rId8"/>
+    <p:sldId id="269" r:id="rId6"/>
+    <p:sldId id="270" r:id="rId7"/>
+    <p:sldId id="271" r:id="rId8"/>
     <p:sldId id="261" r:id="rId9"/>
     <p:sldId id="260" r:id="rId10"/>
     <p:sldId id="267" r:id="rId11"/>
@@ -208,7 +208,7 @@
           <a:p>
             <a:fld id="{C0CFC932-687B-D94D-BAE4-A389EC262234}" type="datetimeFigureOut">
               <a:rPr lang="en-US" smtClean="0"/>
-              <a:t>11/29/22</a:t>
+              <a:t>11/29/2022</a:t>
             </a:fld>
             <a:endParaRPr lang="en-US"/>
           </a:p>
@@ -1784,7 +1784,7 @@
           <a:p>
             <a:fld id="{78ABE3C1-DBE1-495D-B57B-2849774B866A}" type="datetimeFigureOut">
               <a:rPr lang="en-US" dirty="0"/>
-              <a:t>11/29/22</a:t>
+              <a:t>11/29/2022</a:t>
             </a:fld>
             <a:endParaRPr lang="en-US" dirty="0"/>
           </a:p>
@@ -2193,7 +2193,7 @@
           <a:p>
             <a:fld id="{446C117F-5CCF-4837-BE5F-2B92066CAFAF}" type="datetimeFigureOut">
               <a:rPr lang="en-US" dirty="0"/>
-              <a:t>11/29/22</a:t>
+              <a:t>11/29/2022</a:t>
             </a:fld>
             <a:endParaRPr lang="en-US" dirty="0"/>
           </a:p>
@@ -2524,7 +2524,7 @@
           <a:p>
             <a:fld id="{84EB90BD-B6CE-46B7-997F-7313B992CCDC}" type="datetimeFigureOut">
               <a:rPr lang="en-US" dirty="0"/>
-              <a:t>11/29/22</a:t>
+              <a:t>11/29/2022</a:t>
             </a:fld>
             <a:endParaRPr lang="en-US" dirty="0"/>
           </a:p>
@@ -2924,7 +2924,7 @@
           <a:p>
             <a:fld id="{CDB9D11F-B188-461D-B23F-39381795C052}" type="datetimeFigureOut">
               <a:rPr lang="en-US" dirty="0"/>
-              <a:t>11/29/22</a:t>
+              <a:t>11/29/2022</a:t>
             </a:fld>
             <a:endParaRPr lang="en-US" dirty="0"/>
           </a:p>
@@ -3487,7 +3487,7 @@
           <a:p>
             <a:fld id="{52E6D8D9-55A2-4063-B0F3-121F44549695}" type="datetimeFigureOut">
               <a:rPr lang="en-US" dirty="0"/>
-              <a:t>11/29/22</a:t>
+              <a:t>11/29/2022</a:t>
             </a:fld>
             <a:endParaRPr lang="en-US" dirty="0"/>
           </a:p>
@@ -4163,7 +4163,7 @@
           <a:p>
             <a:fld id="{D4B24536-994D-4021-A283-9F449C0DB509}" type="datetimeFigureOut">
               <a:rPr lang="en-US" dirty="0"/>
-              <a:t>11/29/22</a:t>
+              <a:t>11/29/2022</a:t>
             </a:fld>
             <a:endParaRPr lang="en-US" dirty="0"/>
           </a:p>
@@ -5071,7 +5071,7 @@
           <a:p>
             <a:fld id="{3CBBBB78-C96F-47B7-AB17-D852CA960AC9}" type="datetimeFigureOut">
               <a:rPr lang="en-US" dirty="0"/>
-              <a:t>11/29/22</a:t>
+              <a:t>11/29/2022</a:t>
             </a:fld>
             <a:endParaRPr lang="en-US" dirty="0"/>
           </a:p>
@@ -5379,7 +5379,7 @@
           <a:p>
             <a:fld id="{1FA3F48C-C7C6-4055-9F49-3777875E72AE}" type="datetimeFigureOut">
               <a:rPr lang="en-US" dirty="0"/>
-              <a:t>11/29/22</a:t>
+              <a:t>11/29/2022</a:t>
             </a:fld>
             <a:endParaRPr lang="en-US" dirty="0"/>
           </a:p>
@@ -5638,7 +5638,7 @@
           <a:p>
             <a:fld id="{6178E61D-D431-422C-9764-11DAFE33AB63}" type="datetimeFigureOut">
               <a:rPr lang="en-US" dirty="0"/>
-              <a:t>11/29/22</a:t>
+              <a:t>11/29/2022</a:t>
             </a:fld>
             <a:endParaRPr lang="en-US" dirty="0"/>
           </a:p>
@@ -5957,7 +5957,7 @@
           <a:p>
             <a:fld id="{12DE42F4-6EEF-4EF7-8ED4-2208F0F89A08}" type="datetimeFigureOut">
               <a:rPr lang="en-US" dirty="0"/>
-              <a:t>11/29/22</a:t>
+              <a:t>11/29/2022</a:t>
             </a:fld>
             <a:endParaRPr lang="en-US" dirty="0"/>
           </a:p>
@@ -6341,7 +6341,7 @@
           <a:p>
             <a:fld id="{30578ACC-22D6-47C1-A373-4FD133E34F3C}" type="datetimeFigureOut">
               <a:rPr lang="en-US" dirty="0"/>
-              <a:t>11/29/22</a:t>
+              <a:t>11/29/2022</a:t>
             </a:fld>
             <a:endParaRPr lang="en-US" dirty="0"/>
           </a:p>
@@ -6712,7 +6712,7 @@
           <a:p>
             <a:fld id="{4E5A6C69-6797-4E8A-BF37-F2C3751466E9}" type="datetimeFigureOut">
               <a:rPr lang="en-US" dirty="0"/>
-              <a:t>11/29/22</a:t>
+              <a:t>11/29/2022</a:t>
             </a:fld>
             <a:endParaRPr lang="en-US" dirty="0"/>
           </a:p>
@@ -7213,7 +7213,7 @@
           <a:p>
             <a:fld id="{D82014A1-A632-4878-A0D3-F52BA7563730}" type="datetimeFigureOut">
               <a:rPr lang="en-US" dirty="0"/>
-              <a:t>11/29/22</a:t>
+              <a:t>11/29/2022</a:t>
             </a:fld>
             <a:endParaRPr lang="en-US" dirty="0"/>
           </a:p>
@@ -7465,7 +7465,7 @@
           <a:p>
             <a:fld id="{CE99F462-093F-4566-844B-4C71F2739DA5}" type="datetimeFigureOut">
               <a:rPr lang="en-US" dirty="0"/>
-              <a:t>11/29/22</a:t>
+              <a:t>11/29/2022</a:t>
             </a:fld>
             <a:endParaRPr lang="en-US" dirty="0"/>
           </a:p>
@@ -7623,7 +7623,7 @@
           <a:p>
             <a:fld id="{3D24A7AC-904D-4781-85BA-7D10C17ED021}" type="datetimeFigureOut">
               <a:rPr lang="en-US" dirty="0"/>
-              <a:t>11/29/22</a:t>
+              <a:t>11/29/2022</a:t>
             </a:fld>
             <a:endParaRPr lang="en-US" dirty="0"/>
           </a:p>
@@ -8008,7 +8008,7 @@
           <a:p>
             <a:fld id="{E331444B-B92B-4E27-8C94-BB93EAF5CB18}" type="datetimeFigureOut">
               <a:rPr lang="en-US" dirty="0"/>
-              <a:t>11/29/22</a:t>
+              <a:t>11/29/2022</a:t>
             </a:fld>
             <a:endParaRPr lang="en-US" dirty="0"/>
           </a:p>
@@ -8412,7 +8412,7 @@
           <a:p>
             <a:fld id="{363EFA5E-FA76-400D-B3DC-F0BA90E6D107}" type="datetimeFigureOut">
               <a:rPr lang="en-US" dirty="0"/>
-              <a:t>11/29/22</a:t>
+              <a:t>11/29/2022</a:t>
             </a:fld>
             <a:endParaRPr lang="en-US" dirty="0"/>
           </a:p>
@@ -8651,7 +8651,7 @@
           <a:p>
             <a:fld id="{9D6E9DEC-419B-4CC5-A080-3B06BD5A8291}" type="datetimeFigureOut">
               <a:rPr lang="en-US" dirty="0"/>
-              <a:t>11/29/22</a:t>
+              <a:t>11/29/2022</a:t>
             </a:fld>
             <a:endParaRPr lang="en-US" dirty="0"/>
           </a:p>
@@ -10096,6 +10096,13 @@
             </a:r>
           </a:p>
           <a:p>
+            <a:pPr lvl="1"/>
+            <a:r>
+              <a:rPr lang="en-US" sz="1600" dirty="0"/>
+              <a:t>Linear Regression is the supervised Machine Learning model in which the model finds the best fit linear line between the independent and dependent variable</a:t>
+            </a:r>
+          </a:p>
+          <a:p>
             <a:pPr lvl="0"/>
             <a:r>
               <a:rPr lang="en-US" dirty="0"/>
@@ -10114,7 +10121,7 @@
     </p:spTree>
     <p:extLst>
       <p:ext uri="{BB962C8B-B14F-4D97-AF65-F5344CB8AC3E}">
-        <p14:creationId xmlns:p14="http://schemas.microsoft.com/office/powerpoint/2010/main" val="4025184714"/>
+        <p14:creationId xmlns:p14="http://schemas.microsoft.com/office/powerpoint/2010/main" val="3704150116"/>
       </p:ext>
     </p:extLst>
   </p:cSld>
@@ -10205,7 +10212,43 @@
             <a:pPr lvl="1"/>
             <a:r>
               <a:rPr lang="en-US" dirty="0"/>
-              <a:t>Limited data</a:t>
+              <a:t>Long Short Term Memory is a kind of recurrent neural network.</a:t>
+            </a:r>
+          </a:p>
+          <a:p>
+            <a:pPr lvl="1"/>
+            <a:r>
+              <a:rPr lang="en-US" dirty="0"/>
+              <a:t>The LSTM model can be tuned for various parameters such as changing the number of LSTM layers, adding dropout value or increasing the number of epochs.</a:t>
+            </a:r>
+          </a:p>
+          <a:p>
+            <a:pPr lvl="1"/>
+            <a:r>
+              <a:rPr lang="en-US" dirty="0"/>
+              <a:t>LSTM can by default retain the information for a long period of time. It is used for processing, predicting, and classifying on the basis of time-series data. </a:t>
+            </a:r>
+          </a:p>
+          <a:p>
+            <a:pPr lvl="1"/>
+            <a:r>
+              <a:rPr lang="en-US" dirty="0"/>
+              <a:t>Used 50 neurons, 4 layers, 1 dense layer and drop out layers</a:t>
+            </a:r>
+          </a:p>
+          <a:p>
+            <a:pPr lvl="1"/>
+            <a:r>
+              <a:rPr lang="en-US" dirty="0"/>
+              <a:t>Used “</a:t>
+            </a:r>
+            <a:r>
+              <a:rPr lang="en-US" dirty="0" err="1"/>
+              <a:t>adam</a:t>
+            </a:r>
+            <a:r>
+              <a:rPr lang="en-US" dirty="0"/>
+              <a:t>” optimizer</a:t>
             </a:r>
           </a:p>
           <a:p>
@@ -10220,7 +10263,7 @@
     </p:spTree>
     <p:extLst>
       <p:ext uri="{BB962C8B-B14F-4D97-AF65-F5344CB8AC3E}">
-        <p14:creationId xmlns:p14="http://schemas.microsoft.com/office/powerpoint/2010/main" val="3073322436"/>
+        <p14:creationId xmlns:p14="http://schemas.microsoft.com/office/powerpoint/2010/main" val="1028554114"/>
       </p:ext>
     </p:extLst>
   </p:cSld>
@@ -10298,21 +10341,74 @@
         </p:nvSpPr>
         <p:spPr/>
         <p:txBody>
-          <a:bodyPr/>
-          <a:lstStyle/>
+          <a:bodyPr>
+            <a:normAutofit fontScale="92500" lnSpcReduction="20000"/>
+          </a:bodyPr>
+          <a:lstStyle/>
+          <a:p>
+            <a:r>
+              <a:rPr lang="en-US" dirty="0"/>
+              <a:t>ARIMA - </a:t>
+            </a:r>
+            <a:r>
+              <a:rPr lang="en-US" sz="2000" dirty="0"/>
+              <a:t>Autoregressive Integrated Moving Average</a:t>
+            </a:r>
+          </a:p>
+          <a:p>
+            <a:r>
+              <a:rPr lang="en-US" sz="2000" dirty="0"/>
+              <a:t>used for forecasting time series data</a:t>
+            </a:r>
+          </a:p>
+          <a:p>
+            <a:r>
+              <a:rPr lang="en-US" sz="2000" dirty="0"/>
+              <a:t>ARIMA models are generally denoted as ARIMA (</a:t>
+            </a:r>
+            <a:r>
+              <a:rPr lang="en-US" sz="2000" dirty="0" err="1"/>
+              <a:t>p,d,q</a:t>
+            </a:r>
+            <a:r>
+              <a:rPr lang="en-US" sz="2000" dirty="0"/>
+              <a:t>)  where p is the order of autoregressive model, d is the degree of differencing, and q is the order of moving-average model.</a:t>
+            </a:r>
+          </a:p>
+          <a:p>
+            <a:r>
+              <a:rPr lang="en-US" sz="2000" dirty="0"/>
+              <a:t>ARIMA models use differencing to convert a non-stationary time series into a stationary one, and then predict future values from historical data. These models use “auto” correlations and moving averages over residual errors in the data to forecast future values.</a:t>
+            </a:r>
+          </a:p>
+          <a:p>
+            <a:r>
+              <a:rPr lang="en-US" sz="2000" dirty="0"/>
+              <a:t>We trained the model with average of high &amp; low stock prices and tested with “Close” stock price.</a:t>
+            </a:r>
+          </a:p>
+          <a:p>
+            <a:r>
+              <a:rPr lang="en-US" sz="2100" dirty="0"/>
+              <a:t>Used ARIMA(1,1,0) - differenced first-order autoregressive model</a:t>
+            </a:r>
+          </a:p>
+          <a:p>
+            <a:r>
+              <a:rPr lang="en-US" sz="2100" dirty="0"/>
+              <a:t>Performed better when train, test split is 80:20 compared to 90:10 split</a:t>
+            </a:r>
+          </a:p>
           <a:p>
             <a:pPr lvl="0"/>
-            <a:r>
-              <a:rPr lang="en-US" dirty="0"/>
-              <a:t>ARIMA</a:t>
-            </a:r>
+            <a:endParaRPr lang="en-US" dirty="0"/>
           </a:p>
         </p:txBody>
       </p:sp>
     </p:spTree>
     <p:extLst>
       <p:ext uri="{BB962C8B-B14F-4D97-AF65-F5344CB8AC3E}">
-        <p14:creationId xmlns:p14="http://schemas.microsoft.com/office/powerpoint/2010/main" val="586810772"/>
+        <p14:creationId xmlns:p14="http://schemas.microsoft.com/office/powerpoint/2010/main" val="4185597408"/>
       </p:ext>
     </p:extLst>
   </p:cSld>
@@ -10426,7 +10522,7 @@
                 <a:ea typeface="+mn-ea"/>
                 <a:cs typeface="+mn-cs"/>
               </a:rPr>
-              <a:t>R2 score for ARIMA Model : 0.93</a:t>
+              <a:t>R2 score for ARIMA Model : 0.99</a:t>
             </a:r>
             <a:br>
               <a:rPr lang="en-US" dirty="0"/>

</xml_diff>